<commit_message>
updated agenda and intro power point
</commit_message>
<xml_diff>
--- a/Refactoring Workshop.pptx
+++ b/Refactoring Workshop.pptx
@@ -210,7 +210,7 @@
           <a:p>
             <a:fld id="{593211BE-2AAC-4A14-A5B4-00BA75A95635}" type="datetimeFigureOut">
               <a:rPr lang="en-US" smtClean="0"/>
-              <a:t>4/27/2013</a:t>
+              <a:t>4/28/2013</a:t>
             </a:fld>
             <a:endParaRPr lang="en-US"/>
           </a:p>
@@ -9576,11 +9576,7 @@
                     <a:p>
                       <a:r>
                         <a:rPr lang="en-US" dirty="0" smtClean="0"/>
-                        <a:t>Studies </a:t>
-                      </a:r>
-                      <a:r>
-                        <a:rPr lang="en-US" dirty="0" smtClean="0"/>
-                        <a:t>code, documents.</a:t>
+                        <a:t>Studies code, documents.</a:t>
                       </a:r>
                       <a:endParaRPr lang="en-US" dirty="0"/>
                     </a:p>
@@ -10591,7 +10587,6 @@
               <a:rPr lang="en-US" dirty="0" smtClean="0"/>
               <a:t>Balancing act</a:t>
             </a:r>
-            <a:endParaRPr lang="en-US" dirty="0" smtClean="0"/>
           </a:p>
           <a:p>
             <a:pPr lvl="1"/>
@@ -10599,7 +10594,6 @@
               <a:rPr lang="en-US" dirty="0" smtClean="0"/>
               <a:t>When?</a:t>
             </a:r>
-            <a:endParaRPr lang="en-US" dirty="0" smtClean="0"/>
           </a:p>
           <a:p>
             <a:pPr lvl="1"/>
@@ -10607,33 +10601,24 @@
               <a:rPr lang="en-US" dirty="0" smtClean="0"/>
               <a:t>Risk?</a:t>
             </a:r>
+          </a:p>
+          <a:p>
+            <a:pPr lvl="1"/>
+            <a:r>
+              <a:rPr lang="en-US" dirty="0" smtClean="0"/>
+              <a:t>Benefit?</a:t>
+            </a:r>
+          </a:p>
+          <a:p>
+            <a:endParaRPr lang="en-US" dirty="0"/>
+          </a:p>
+          <a:p>
             <a:endParaRPr lang="en-US" dirty="0" smtClean="0"/>
           </a:p>
           <a:p>
-            <a:pPr lvl="1"/>
             <a:r>
               <a:rPr lang="en-US" dirty="0" smtClean="0"/>
-              <a:t>Benefit</a:t>
-            </a:r>
-            <a:r>
-              <a:rPr lang="en-US" dirty="0" smtClean="0"/>
-              <a:t>?</a:t>
-            </a:r>
-          </a:p>
-          <a:p>
-            <a:endParaRPr lang="en-US" dirty="0"/>
-          </a:p>
-          <a:p>
-            <a:endParaRPr lang="en-US" dirty="0" smtClean="0"/>
-          </a:p>
-          <a:p>
-            <a:r>
-              <a:rPr lang="en-US" dirty="0" smtClean="0"/>
-              <a:t>Not immediately </a:t>
-            </a:r>
-            <a:r>
-              <a:rPr lang="en-US" dirty="0" smtClean="0"/>
-              <a:t>profitable</a:t>
+              <a:t>Not immediately profitable</a:t>
             </a:r>
           </a:p>
           <a:p>
@@ -10646,41 +10631,19 @@
           <a:p>
             <a:r>
               <a:rPr lang="en-US" dirty="0" smtClean="0"/>
-              <a:t>Easier with well </a:t>
-            </a:r>
+              <a:t>Easier with well written code.</a:t>
+            </a:r>
+          </a:p>
+          <a:p>
             <a:r>
               <a:rPr lang="en-US" dirty="0" smtClean="0"/>
-              <a:t>written code</a:t>
-            </a:r>
+              <a:t>Most code is not well written.</a:t>
+            </a:r>
+          </a:p>
+          <a:p>
             <a:r>
               <a:rPr lang="en-US" dirty="0" smtClean="0"/>
-              <a:t>.</a:t>
-            </a:r>
-            <a:endParaRPr lang="en-US" dirty="0" smtClean="0"/>
-          </a:p>
-          <a:p>
-            <a:r>
-              <a:rPr lang="en-US" dirty="0" smtClean="0"/>
-              <a:t>Most code </a:t>
-            </a:r>
-            <a:r>
-              <a:rPr lang="en-US" dirty="0" smtClean="0"/>
-              <a:t>is not well written.</a:t>
-            </a:r>
-            <a:endParaRPr lang="en-US" dirty="0" smtClean="0"/>
-          </a:p>
-          <a:p>
-            <a:r>
-              <a:rPr lang="en-US" dirty="0" smtClean="0"/>
-              <a:t>Most code </a:t>
-            </a:r>
-            <a:r>
-              <a:rPr lang="en-US" dirty="0" smtClean="0"/>
-              <a:t>is </a:t>
-            </a:r>
-            <a:r>
-              <a:rPr lang="en-US" dirty="0" smtClean="0"/>
-              <a:t>difficult to refactor safely.</a:t>
+              <a:t>Most code is difficult to refactor safely.</a:t>
             </a:r>
             <a:endParaRPr lang="en-US" dirty="0"/>
           </a:p>
@@ -11452,11 +11415,6 @@
               </a:rPr>
               <a:t>improvement in another area of code</a:t>
             </a:r>
-            <a:endParaRPr lang="en-US" sz="2800" dirty="0">
-              <a:solidFill>
-                <a:schemeClr val="tx2"/>
-              </a:solidFill>
-            </a:endParaRPr>
           </a:p>
           <a:p>
             <a:endParaRPr lang="en-US" dirty="0"/>
@@ -11554,30 +11512,14 @@
           <a:p>
             <a:r>
               <a:rPr lang="en-US" dirty="0" smtClean="0"/>
-              <a:t>Actual </a:t>
-            </a:r>
+              <a:t>Actual affects</a:t>
+            </a:r>
+          </a:p>
+          <a:p>
+            <a:pPr lvl="1"/>
             <a:r>
               <a:rPr lang="en-US" dirty="0" smtClean="0"/>
-              <a:t>affects</a:t>
-            </a:r>
-          </a:p>
-          <a:p>
-            <a:pPr lvl="1"/>
-            <a:r>
-              <a:rPr lang="en-US" dirty="0" smtClean="0"/>
-              <a:t>Saving </a:t>
-            </a:r>
-            <a:r>
-              <a:rPr lang="en-US" dirty="0" smtClean="0"/>
-              <a:t>deleted</a:t>
-            </a:r>
-            <a:r>
-              <a:rPr lang="en-US" dirty="0" smtClean="0"/>
-              <a:t> </a:t>
-            </a:r>
-            <a:r>
-              <a:rPr lang="en-US" dirty="0" smtClean="0"/>
-              <a:t>all </a:t>
+              <a:t>Saving deleted all </a:t>
             </a:r>
             <a:r>
               <a:rPr lang="en-US" dirty="0" err="1" smtClean="0"/>
@@ -11585,64 +11527,36 @@
             </a:r>
             <a:r>
               <a:rPr lang="en-US" dirty="0" smtClean="0"/>
-              <a:t> within the </a:t>
-            </a:r>
+              <a:t> within the group.</a:t>
+            </a:r>
+          </a:p>
+          <a:p>
+            <a:pPr lvl="1"/>
             <a:r>
               <a:rPr lang="en-US" dirty="0" smtClean="0"/>
-              <a:t>group.</a:t>
-            </a:r>
-            <a:endParaRPr lang="en-US" dirty="0" smtClean="0"/>
+              <a:t>Passed QA and client testing.</a:t>
+            </a:r>
           </a:p>
           <a:p>
             <a:pPr lvl="1"/>
             <a:r>
               <a:rPr lang="en-US" dirty="0" smtClean="0"/>
-              <a:t>Passed </a:t>
-            </a:r>
+              <a:t>Users took 3 weeks to notice.</a:t>
+            </a:r>
+          </a:p>
+          <a:p>
+            <a:pPr lvl="1"/>
             <a:r>
               <a:rPr lang="en-US" dirty="0" smtClean="0"/>
-              <a:t>QA and client testing.</a:t>
+              <a:t>31k of 36k records deleted.</a:t>
             </a:r>
           </a:p>
           <a:p>
             <a:pPr lvl="1"/>
             <a:r>
               <a:rPr lang="en-US" dirty="0" smtClean="0"/>
-              <a:t>Users took 3 weeks </a:t>
-            </a:r>
-            <a:r>
-              <a:rPr lang="en-US" dirty="0" smtClean="0"/>
-              <a:t>to notice.</a:t>
-            </a:r>
-            <a:endParaRPr lang="en-US" dirty="0" smtClean="0"/>
-          </a:p>
-          <a:p>
-            <a:pPr lvl="1"/>
-            <a:r>
-              <a:rPr lang="en-US" dirty="0" smtClean="0"/>
-              <a:t>31k of 36k records </a:t>
-            </a:r>
-            <a:r>
-              <a:rPr lang="en-US" dirty="0" smtClean="0"/>
-              <a:t>deleted.</a:t>
-            </a:r>
-            <a:endParaRPr lang="en-US" dirty="0" smtClean="0"/>
-          </a:p>
-          <a:p>
-            <a:pPr lvl="1"/>
-            <a:r>
-              <a:rPr lang="en-US" dirty="0" smtClean="0"/>
-              <a:t>1 week </a:t>
-            </a:r>
-            <a:r>
-              <a:rPr lang="en-US" dirty="0" smtClean="0"/>
-              <a:t>to fix</a:t>
-            </a:r>
-            <a:r>
-              <a:rPr lang="en-US" dirty="0" smtClean="0"/>
-              <a:t>.</a:t>
-            </a:r>
-            <a:endParaRPr lang="en-US" dirty="0" smtClean="0"/>
+              <a:t>1 week to fix.</a:t>
+            </a:r>
           </a:p>
           <a:p>
             <a:pPr lvl="1"/>
@@ -11655,15 +11569,7 @@
             <a:pPr lvl="1"/>
             <a:r>
               <a:rPr lang="en-US" dirty="0" smtClean="0"/>
-              <a:t>Lowered users </a:t>
-            </a:r>
-            <a:r>
-              <a:rPr lang="en-US" dirty="0" smtClean="0"/>
-              <a:t>confidence </a:t>
-            </a:r>
-            <a:r>
-              <a:rPr lang="en-US" dirty="0" smtClean="0"/>
-              <a:t>level.</a:t>
+              <a:t>Lowered users confidence level.</a:t>
             </a:r>
             <a:endParaRPr lang="en-US" dirty="0"/>
           </a:p>
@@ -12274,11 +12180,7 @@
           <a:p>
             <a:r>
               <a:rPr lang="en-US" dirty="0" smtClean="0"/>
-              <a:t>Write code </a:t>
-            </a:r>
-            <a:r>
-              <a:rPr lang="en-US" dirty="0" smtClean="0"/>
-              <a:t>for other people.</a:t>
+              <a:t>Write code for other people.</a:t>
             </a:r>
           </a:p>
           <a:p>
@@ -12287,51 +12189,25 @@
               <a:rPr lang="en-US" dirty="0" smtClean="0"/>
               <a:t>Code review Often.</a:t>
             </a:r>
-            <a:endParaRPr lang="en-US" dirty="0" smtClean="0"/>
           </a:p>
           <a:p>
             <a:pPr lvl="1"/>
             <a:r>
               <a:rPr lang="en-US" dirty="0" smtClean="0"/>
-              <a:t>Share your code </a:t>
-            </a:r>
+              <a:t>Share your code (OSS).</a:t>
+            </a:r>
+          </a:p>
+          <a:p>
             <a:r>
               <a:rPr lang="en-US" dirty="0" smtClean="0"/>
-              <a:t>(OSS</a:t>
-            </a:r>
+              <a:t>Make code understandable.</a:t>
+            </a:r>
+          </a:p>
+          <a:p>
+            <a:pPr lvl="1"/>
             <a:r>
               <a:rPr lang="en-US" dirty="0" smtClean="0"/>
-              <a:t>).</a:t>
-            </a:r>
-          </a:p>
-          <a:p>
-            <a:r>
-              <a:rPr lang="en-US" dirty="0" smtClean="0"/>
-              <a:t>Make </a:t>
-            </a:r>
-            <a:r>
-              <a:rPr lang="en-US" dirty="0" smtClean="0"/>
-              <a:t>code </a:t>
-            </a:r>
-            <a:r>
-              <a:rPr lang="en-US" dirty="0" smtClean="0"/>
-              <a:t>understandable.</a:t>
-            </a:r>
-            <a:endParaRPr lang="en-US" dirty="0" smtClean="0"/>
-          </a:p>
-          <a:p>
-            <a:pPr lvl="1"/>
-            <a:r>
-              <a:rPr lang="en-US" dirty="0" smtClean="0"/>
-              <a:t>Project structure </a:t>
-            </a:r>
-            <a:r>
-              <a:rPr lang="en-US" dirty="0" smtClean="0"/>
-              <a:t>matters</a:t>
-            </a:r>
-            <a:r>
-              <a:rPr lang="en-US" dirty="0" smtClean="0"/>
-              <a:t>.</a:t>
+              <a:t>Project structure matters.</a:t>
             </a:r>
           </a:p>
           <a:p>
@@ -12347,7 +12223,6 @@
               <a:rPr lang="en-US" dirty="0" smtClean="0"/>
               <a:t>Method Signatures are your Road Signs.</a:t>
             </a:r>
-            <a:endParaRPr lang="en-US" dirty="0" smtClean="0"/>
           </a:p>
           <a:p>
             <a:pPr lvl="1"/>
@@ -13170,14 +13045,12 @@
               <a:rPr lang="en-US" dirty="0" smtClean="0"/>
               <a:t>Learn good techniques.</a:t>
             </a:r>
-            <a:endParaRPr lang="en-US" dirty="0" smtClean="0"/>
           </a:p>
           <a:p>
             <a:r>
               <a:rPr lang="en-US" dirty="0" smtClean="0"/>
               <a:t>And learn when you’ve taken them too far…</a:t>
             </a:r>
-            <a:endParaRPr lang="en-US" dirty="0" smtClean="0"/>
           </a:p>
           <a:p>
             <a:pPr lvl="1"/>
@@ -13646,13 +13519,8 @@
             <a:pPr lvl="1"/>
             <a:r>
               <a:rPr lang="en-US" dirty="0" smtClean="0"/>
-              <a:t>We will assume all code was </a:t>
-            </a:r>
-            <a:r>
-              <a:rPr lang="en-US" dirty="0" smtClean="0"/>
-              <a:t>not written by YOU.</a:t>
-            </a:r>
-            <a:endParaRPr lang="en-US" dirty="0" smtClean="0"/>
+              <a:t>We will assume all code was not written by YOU.</a:t>
+            </a:r>
           </a:p>
           <a:p>
             <a:pPr lvl="1"/>
@@ -13660,27 +13528,13 @@
               <a:rPr lang="en-US" dirty="0" smtClean="0"/>
               <a:t>Practice.</a:t>
             </a:r>
-            <a:endParaRPr lang="en-US" dirty="0" smtClean="0"/>
           </a:p>
           <a:p>
             <a:pPr lvl="2"/>
             <a:r>
               <a:rPr lang="en-US" dirty="0" smtClean="0"/>
-              <a:t>The BAD - </a:t>
-            </a:r>
-            <a:r>
-              <a:rPr lang="en-US" dirty="0" smtClean="0"/>
-              <a:t>code </a:t>
-            </a:r>
-            <a:r>
-              <a:rPr lang="en-US" dirty="0" smtClean="0"/>
-              <a:t>smells and </a:t>
-            </a:r>
-            <a:r>
-              <a:rPr lang="en-US" dirty="0" smtClean="0"/>
-              <a:t>anti-patterns.</a:t>
-            </a:r>
-            <a:endParaRPr lang="en-US" dirty="0" smtClean="0"/>
+              <a:t>The BAD - code smells and anti-patterns.</a:t>
+            </a:r>
           </a:p>
           <a:p>
             <a:pPr lvl="2"/>
@@ -13688,7 +13542,6 @@
               <a:rPr lang="en-US" dirty="0" smtClean="0"/>
               <a:t>The GOOD – patterns and techniques.</a:t>
             </a:r>
-            <a:endParaRPr lang="en-US" dirty="0" smtClean="0"/>
           </a:p>
           <a:p>
             <a:pPr lvl="1"/>
@@ -13698,11 +13551,7 @@
             </a:r>
             <a:r>
               <a:rPr lang="en-US" dirty="0" smtClean="0"/>
-              <a:t>ode </a:t>
-            </a:r>
-            <a:r>
-              <a:rPr lang="en-US" dirty="0" smtClean="0"/>
-              <a:t>review by committee.</a:t>
+              <a:t>ode review by committee.</a:t>
             </a:r>
           </a:p>
           <a:p>
@@ -13718,7 +13567,6 @@
               <a:rPr lang="en-US" dirty="0" smtClean="0"/>
               <a:t>Practice, practice, practice.</a:t>
             </a:r>
-            <a:endParaRPr lang="en-US" dirty="0" smtClean="0"/>
           </a:p>
         </p:txBody>
       </p:sp>
@@ -15016,8 +14864,41 @@
           <a:lstStyle/>
           <a:p>
             <a:r>
+              <a:rPr lang="en-US" sz="2000" b="1" i="1" dirty="0" smtClean="0"/>
+              <a:t>“</a:t>
+            </a:r>
+            <a:r>
               <a:rPr lang="en-US" sz="2000" b="1" dirty="0"/>
-              <a:t>"Refactoring changes the program in small steps. If you make a mistake, it is easy to find the bug."</a:t>
+              <a:t>Refactoring should never appear as a task on a schedule. Keeping code clean is just something that you do all the time</a:t>
+            </a:r>
+            <a:r>
+              <a:rPr lang="en-US" sz="2000" b="1" dirty="0" smtClean="0"/>
+              <a:t>.” </a:t>
+            </a:r>
+            <a:br>
+              <a:rPr lang="en-US" sz="2000" b="1" dirty="0" smtClean="0"/>
+            </a:br>
+            <a:r>
+              <a:rPr lang="en-US" sz="2000" dirty="0"/>
+              <a:t>- </a:t>
+            </a:r>
+            <a:r>
+              <a:rPr lang="en-US" sz="2000" i="1" dirty="0" smtClean="0"/>
+              <a:t>Uncle Bob Martin, Clean Code</a:t>
+            </a:r>
+            <a:endParaRPr lang="en-US" sz="2000" i="1" dirty="0" smtClean="0"/>
+          </a:p>
+          <a:p>
+            <a:endParaRPr lang="en-US" sz="2000" b="1" dirty="0" smtClean="0"/>
+          </a:p>
+          <a:p>
+            <a:r>
+              <a:rPr lang="en-US" sz="2000" b="1" dirty="0" smtClean="0"/>
+              <a:t>"</a:t>
+            </a:r>
+            <a:r>
+              <a:rPr lang="en-US" sz="2000" b="1" dirty="0"/>
+              <a:t>Refactoring changes the program in small steps. If you make a mistake, it is easy to find the bug."</a:t>
             </a:r>
             <a:r>
               <a:rPr lang="en-US" sz="2000" dirty="0"/>
@@ -15040,7 +14921,6 @@
               <a:rPr lang="en-US" sz="2000" i="1" dirty="0"/>
               <a:t>, Refactoring: Improving the Design of Existing Code </a:t>
             </a:r>
-            <a:endParaRPr lang="en-US" sz="2000" i="1" dirty="0" smtClean="0"/>
           </a:p>
           <a:p>
             <a:pPr marL="0" indent="0">
@@ -15050,60 +14930,33 @@
           </a:p>
           <a:p>
             <a:r>
+              <a:rPr lang="en-US" sz="2000" b="1" i="1" dirty="0" smtClean="0"/>
+              <a:t>“</a:t>
+            </a:r>
+            <a:r>
               <a:rPr lang="en-US" sz="2000" b="1" dirty="0"/>
-              <a:t>"When you feel the need to write a comment, first try to refactor the code so that any comment becomes </a:t>
+              <a:t>Don’t leave “broken windows” (bad designs, wrong decisions, or poor code) unrepaired. Fix each one as soon as it is discovered</a:t>
             </a:r>
             <a:r>
               <a:rPr lang="en-US" sz="2000" b="1" dirty="0" smtClean="0"/>
-              <a:t>superfluous</a:t>
-            </a:r>
-            <a:r>
-              <a:rPr lang="en-US" sz="2000" b="1" dirty="0"/>
-              <a:t>."</a:t>
-            </a:r>
-            <a:r>
-              <a:rPr lang="en-US" sz="2000" dirty="0"/>
-              <a:t> </a:t>
+              <a:t>.” </a:t>
             </a:r>
             <a:br>
-              <a:rPr lang="en-US" sz="2000" dirty="0"/>
+              <a:rPr lang="en-US" sz="2000" b="1" dirty="0" smtClean="0"/>
             </a:br>
             <a:r>
-              <a:rPr lang="en-US" sz="2000" dirty="0"/>
-              <a:t>- </a:t>
-            </a:r>
-            <a:r>
-              <a:rPr lang="en-US" sz="2000" i="1" dirty="0">
-                <a:hlinkClick r:id="rId2"/>
-              </a:rPr>
-              <a:t>Martin Fowler</a:t>
+              <a:rPr lang="en-US" sz="2000" dirty="0" smtClean="0"/>
+              <a:t>- </a:t>
+            </a:r>
+            <a:r>
+              <a:rPr lang="en-US" sz="2000" i="1" dirty="0" smtClean="0"/>
+              <a:t>Andrew Hunt &amp; David Thomas, The </a:t>
             </a:r>
             <a:r>
               <a:rPr lang="en-US" sz="2000" i="1" dirty="0"/>
-              <a:t>, Refactoring: Improving the Design of Existing </a:t>
-            </a:r>
-            <a:r>
-              <a:rPr lang="en-US" sz="2000" i="1" dirty="0" smtClean="0"/>
-              <a:t>Code</a:t>
-            </a:r>
-          </a:p>
-          <a:p>
+              <a:t>Pragmatic Programmer</a:t>
+            </a:r>
             <a:endParaRPr lang="en-US" sz="2000" i="1" dirty="0" smtClean="0"/>
-          </a:p>
-          <a:p>
-            <a:r>
-              <a:rPr lang="en-US" sz="2000" i="1" dirty="0" smtClean="0"/>
-              <a:t>Uncle Bob quote</a:t>
-            </a:r>
-          </a:p>
-          <a:p>
-            <a:endParaRPr lang="en-US" sz="2000" i="1" dirty="0" smtClean="0"/>
-          </a:p>
-          <a:p>
-            <a:r>
-              <a:rPr lang="en-US" sz="2000" i="1" dirty="0" smtClean="0"/>
-              <a:t>Broken windows quote (Pragmatic programmer?)</a:t>
-            </a:r>
           </a:p>
           <a:p>
             <a:endParaRPr lang="en-US" sz="2000" i="1" dirty="0"/>
@@ -15126,10 +14979,10 @@
           <a:p>
             <a:pPr lvl="1"/>
             <a:r>
-              <a:rPr lang="en-US" sz="1600" i="1" dirty="0" smtClean="0"/>
-              <a:t>Source Unknown, about TDD</a:t>
-            </a:r>
-            <a:endParaRPr lang="en-US" sz="1600" i="1" dirty="0"/>
+              <a:rPr lang="en-US" sz="2000" i="1" dirty="0" smtClean="0"/>
+              <a:t>TDD</a:t>
+            </a:r>
+            <a:endParaRPr lang="en-US" sz="2000" i="1" dirty="0"/>
           </a:p>
           <a:p>
             <a:endParaRPr lang="en-US" sz="2000" dirty="0"/>
@@ -15583,33 +15436,15 @@
                                   </p:childTnLst>
                                 </p:cTn>
                               </p:par>
-                            </p:childTnLst>
-                          </p:cTn>
-                        </p:par>
-                      </p:childTnLst>
-                    </p:cTn>
-                  </p:par>
-                  <p:par>
-                    <p:cTn id="27" fill="hold">
-                      <p:stCondLst>
-                        <p:cond delay="indefinite"/>
-                      </p:stCondLst>
-                      <p:childTnLst>
-                        <p:par>
-                          <p:cTn id="28" fill="hold">
-                            <p:stCondLst>
-                              <p:cond delay="0"/>
-                            </p:stCondLst>
-                            <p:childTnLst>
                               <p:par>
-                                <p:cTn id="29" presetID="2" presetClass="entr" presetSubtype="4" fill="hold" nodeType="clickEffect">
+                                <p:cTn id="27" presetID="2" presetClass="entr" presetSubtype="4" fill="hold" nodeType="withEffect">
                                   <p:stCondLst>
                                     <p:cond delay="0"/>
                                   </p:stCondLst>
                                   <p:childTnLst>
                                     <p:set>
                                       <p:cBhvr>
-                                        <p:cTn id="30" dur="1" fill="hold">
+                                        <p:cTn id="28" dur="1" fill="hold">
                                           <p:stCondLst>
                                             <p:cond delay="0"/>
                                           </p:stCondLst>
@@ -15617,7 +15452,7 @@
                                         <p:tgtEl>
                                           <p:spTgt spid="2">
                                             <p:txEl>
-                                              <p:pRg st="8" end="8"/>
+                                              <p:pRg st="7" end="7"/>
                                             </p:txEl>
                                           </p:spTgt>
                                         </p:tgtEl>
@@ -15631,11 +15466,11 @@
                                     </p:set>
                                     <p:anim calcmode="lin" valueType="num">
                                       <p:cBhvr additive="base">
-                                        <p:cTn id="31" dur="500" fill="hold"/>
+                                        <p:cTn id="29" dur="500" fill="hold"/>
                                         <p:tgtEl>
                                           <p:spTgt spid="2">
                                             <p:txEl>
-                                              <p:pRg st="8" end="8"/>
+                                              <p:pRg st="7" end="7"/>
                                             </p:txEl>
                                           </p:spTgt>
                                         </p:tgtEl>
@@ -15658,96 +15493,11 @@
                                     </p:anim>
                                     <p:anim calcmode="lin" valueType="num">
                                       <p:cBhvr additive="base">
-                                        <p:cTn id="32" dur="500" fill="hold"/>
+                                        <p:cTn id="30" dur="500" fill="hold"/>
                                         <p:tgtEl>
                                           <p:spTgt spid="2">
                                             <p:txEl>
-                                              <p:pRg st="8" end="8"/>
-                                            </p:txEl>
-                                          </p:spTgt>
-                                        </p:tgtEl>
-                                        <p:attrNameLst>
-                                          <p:attrName>ppt_y</p:attrName>
-                                        </p:attrNameLst>
-                                      </p:cBhvr>
-                                      <p:tavLst>
-                                        <p:tav tm="0">
-                                          <p:val>
-                                            <p:strVal val="1+#ppt_h/2"/>
-                                          </p:val>
-                                        </p:tav>
-                                        <p:tav tm="100000">
-                                          <p:val>
-                                            <p:strVal val="#ppt_y"/>
-                                          </p:val>
-                                        </p:tav>
-                                      </p:tavLst>
-                                    </p:anim>
-                                  </p:childTnLst>
-                                </p:cTn>
-                              </p:par>
-                              <p:par>
-                                <p:cTn id="33" presetID="2" presetClass="entr" presetSubtype="4" fill="hold" nodeType="withEffect">
-                                  <p:stCondLst>
-                                    <p:cond delay="0"/>
-                                  </p:stCondLst>
-                                  <p:childTnLst>
-                                    <p:set>
-                                      <p:cBhvr>
-                                        <p:cTn id="34" dur="1" fill="hold">
-                                          <p:stCondLst>
-                                            <p:cond delay="0"/>
-                                          </p:stCondLst>
-                                        </p:cTn>
-                                        <p:tgtEl>
-                                          <p:spTgt spid="2">
-                                            <p:txEl>
-                                              <p:pRg st="9" end="9"/>
-                                            </p:txEl>
-                                          </p:spTgt>
-                                        </p:tgtEl>
-                                        <p:attrNameLst>
-                                          <p:attrName>style.visibility</p:attrName>
-                                        </p:attrNameLst>
-                                      </p:cBhvr>
-                                      <p:to>
-                                        <p:strVal val="visible"/>
-                                      </p:to>
-                                    </p:set>
-                                    <p:anim calcmode="lin" valueType="num">
-                                      <p:cBhvr additive="base">
-                                        <p:cTn id="35" dur="500" fill="hold"/>
-                                        <p:tgtEl>
-                                          <p:spTgt spid="2">
-                                            <p:txEl>
-                                              <p:pRg st="9" end="9"/>
-                                            </p:txEl>
-                                          </p:spTgt>
-                                        </p:tgtEl>
-                                        <p:attrNameLst>
-                                          <p:attrName>ppt_x</p:attrName>
-                                        </p:attrNameLst>
-                                      </p:cBhvr>
-                                      <p:tavLst>
-                                        <p:tav tm="0">
-                                          <p:val>
-                                            <p:strVal val="#ppt_x"/>
-                                          </p:val>
-                                        </p:tav>
-                                        <p:tav tm="100000">
-                                          <p:val>
-                                            <p:strVal val="#ppt_x"/>
-                                          </p:val>
-                                        </p:tav>
-                                      </p:tavLst>
-                                    </p:anim>
-                                    <p:anim calcmode="lin" valueType="num">
-                                      <p:cBhvr additive="base">
-                                        <p:cTn id="36" dur="500" fill="hold"/>
-                                        <p:tgtEl>
-                                          <p:spTgt spid="2">
-                                            <p:txEl>
-                                              <p:pRg st="9" end="9"/>
+                                              <p:pRg st="7" end="7"/>
                                             </p:txEl>
                                           </p:spTgt>
                                         </p:tgtEl>
@@ -15849,27 +15599,15 @@
             <a:pPr lvl="1"/>
             <a:r>
               <a:rPr lang="en-US" dirty="0" smtClean="0"/>
-              <a:t>Code is never perfect on the first try</a:t>
-            </a:r>
+              <a:t>Code is never perfect on the first try.</a:t>
+            </a:r>
+            <a:endParaRPr lang="en-US" dirty="0"/>
+          </a:p>
+          <a:p>
+            <a:pPr lvl="1"/>
             <a:r>
               <a:rPr lang="en-US" dirty="0" smtClean="0"/>
-              <a:t>.</a:t>
-            </a:r>
-            <a:endParaRPr lang="en-US" dirty="0"/>
-          </a:p>
-          <a:p>
-            <a:pPr lvl="1"/>
-            <a:r>
-              <a:rPr lang="en-US" dirty="0" smtClean="0"/>
-              <a:t>(</a:t>
-            </a:r>
-            <a:r>
-              <a:rPr lang="en-US" dirty="0" smtClean="0"/>
-              <a:t>Business) n</a:t>
-            </a:r>
-            <a:r>
-              <a:rPr lang="en-US" dirty="0" smtClean="0"/>
-              <a:t>eeds change.</a:t>
+              <a:t>(Business) needs change.</a:t>
             </a:r>
           </a:p>
           <a:p>
@@ -15885,7 +15623,6 @@
               <a:rPr lang="en-US" dirty="0" smtClean="0"/>
               <a:t>To remove dead code.</a:t>
             </a:r>
-            <a:endParaRPr lang="en-US" dirty="0" smtClean="0"/>
           </a:p>
           <a:p>
             <a:pPr lvl="1"/>
@@ -15900,7 +15637,6 @@
               <a:rPr lang="en-US" dirty="0" smtClean="0"/>
               <a:t>Move RISK.</a:t>
             </a:r>
-            <a:endParaRPr lang="en-US" dirty="0" smtClean="0"/>
           </a:p>
           <a:p>
             <a:pPr lvl="1"/>
@@ -15908,7 +15644,6 @@
               <a:rPr lang="en-US" dirty="0" smtClean="0"/>
               <a:t>Reduce technical debt.</a:t>
             </a:r>
-            <a:endParaRPr lang="en-US" dirty="0" smtClean="0"/>
           </a:p>
           <a:p>
             <a:pPr lvl="1"/>
@@ -15916,7 +15651,6 @@
               <a:rPr lang="en-US" dirty="0" smtClean="0"/>
               <a:t>Improve coding skills.</a:t>
             </a:r>
-            <a:endParaRPr lang="en-US" dirty="0" smtClean="0"/>
           </a:p>
           <a:p>
             <a:pPr lvl="2"/>
@@ -16586,29 +16320,15 @@
             <a:pPr lvl="1"/>
             <a:r>
               <a:rPr lang="en-US" dirty="0" smtClean="0"/>
-              <a:t>Legacy Code IS a minefield</a:t>
-            </a:r>
+              <a:t>Legacy Code IS a minefield.</a:t>
+            </a:r>
+          </a:p>
+          <a:p>
+            <a:pPr lvl="1"/>
             <a:r>
               <a:rPr lang="en-US" dirty="0" smtClean="0"/>
-              <a:t>.</a:t>
-            </a:r>
-            <a:endParaRPr lang="en-US" dirty="0" smtClean="0"/>
-          </a:p>
-          <a:p>
-            <a:pPr lvl="1"/>
-            <a:r>
-              <a:rPr lang="en-US" dirty="0" smtClean="0"/>
-              <a:t>Don’t churn </a:t>
-            </a:r>
-            <a:r>
-              <a:rPr lang="en-US" dirty="0" smtClean="0"/>
-              <a:t>code </a:t>
-            </a:r>
-            <a:r>
-              <a:rPr lang="en-US" dirty="0" smtClean="0"/>
-              <a:t>– we don’t want to refactor/rewrite EVERYTHING!</a:t>
-            </a:r>
-            <a:endParaRPr lang="en-US" dirty="0" smtClean="0"/>
+              <a:t>Don’t churn code – we don’t want to refactor/rewrite EVERYTHING!</a:t>
+            </a:r>
           </a:p>
           <a:p>
             <a:pPr lvl="1"/>

</xml_diff>

<commit_message>
minor changes to the agenda
</commit_message>
<xml_diff>
--- a/Refactoring Workshop.pptx
+++ b/Refactoring Workshop.pptx
@@ -210,7 +210,7 @@
           <a:p>
             <a:fld id="{593211BE-2AAC-4A14-A5B4-00BA75A95635}" type="datetimeFigureOut">
               <a:rPr lang="en-US" smtClean="0"/>
-              <a:t>4/28/2013</a:t>
+              <a:t>4/30/2013</a:t>
             </a:fld>
             <a:endParaRPr lang="en-US"/>
           </a:p>
@@ -14101,14 +14101,14 @@
           <p:nvPr>
             <p:extLst>
               <p:ext uri="{D42A27DB-BD31-4B8C-83A1-F6EECF244321}">
-                <p14:modId xmlns:p14="http://schemas.microsoft.com/office/powerpoint/2010/main" val="2699992030"/>
+                <p14:modId xmlns:p14="http://schemas.microsoft.com/office/powerpoint/2010/main" val="543504191"/>
               </p:ext>
             </p:extLst>
           </p:nvPr>
         </p:nvGraphicFramePr>
         <p:xfrm>
           <a:off x="381000" y="1523999"/>
-          <a:ext cx="7924800" cy="4264780"/>
+          <a:ext cx="7924800" cy="3899020"/>
         </p:xfrm>
         <a:graphic>
           <a:graphicData uri="http://schemas.openxmlformats.org/drawingml/2006/table">
@@ -14158,7 +14158,7 @@
                     <a:p>
                       <a:r>
                         <a:rPr lang="en-US" dirty="0" smtClean="0"/>
-                        <a:t>8am-8:45am</a:t>
+                        <a:t>8am-9:45am</a:t>
                       </a:r>
                       <a:endParaRPr lang="en-US" dirty="0"/>
                     </a:p>
@@ -14172,37 +14172,7 @@
                     <a:p>
                       <a:r>
                         <a:rPr lang="en-US" dirty="0" smtClean="0"/>
-                        <a:t>Intro</a:t>
-                      </a:r>
-                      <a:endParaRPr lang="en-US" dirty="0"/>
-                    </a:p>
-                  </a:txBody>
-                  <a:tcPr/>
-                </a:tc>
-              </a:tr>
-              <a:tr h="363197">
-                <a:tc>
-                  <a:txBody>
-                    <a:bodyPr/>
-                    <a:lstStyle/>
-                    <a:p>
-                      <a:r>
-                        <a:rPr lang="en-US" dirty="0" smtClean="0"/>
-                        <a:t>8:45am-9:45am</a:t>
-                      </a:r>
-                      <a:endParaRPr lang="en-US" dirty="0"/>
-                    </a:p>
-                  </a:txBody>
-                  <a:tcPr/>
-                </a:tc>
-                <a:tc>
-                  <a:txBody>
-                    <a:bodyPr/>
-                    <a:lstStyle/>
-                    <a:p>
-                      <a:r>
-                        <a:rPr lang="en-US" dirty="0" smtClean="0"/>
-                        <a:t>Code Smells</a:t>
+                        <a:t>Intro &amp; Calories Calculator App</a:t>
                       </a:r>
                       <a:endParaRPr lang="en-US" dirty="0"/>
                     </a:p>
@@ -14248,7 +14218,7 @@
                     <a:p>
                       <a:r>
                         <a:rPr lang="en-US" dirty="0" smtClean="0"/>
-                        <a:t>10:00am-12pm</a:t>
+                        <a:t>10am-12pm</a:t>
                       </a:r>
                       <a:endParaRPr lang="en-US" dirty="0"/>
                     </a:p>
@@ -14262,7 +14232,11 @@
                     <a:p>
                       <a:r>
                         <a:rPr lang="en-US" dirty="0" smtClean="0"/>
-                        <a:t>Code Challenges</a:t>
+                        <a:t>Code</a:t>
+                      </a:r>
+                      <a:r>
+                        <a:rPr lang="en-US" baseline="0" dirty="0" smtClean="0"/>
+                        <a:t> Smells</a:t>
                       </a:r>
                       <a:endParaRPr lang="en-US" dirty="0"/>
                     </a:p>
@@ -14322,7 +14296,7 @@
                     <a:p>
                       <a:r>
                         <a:rPr lang="en-US" dirty="0" smtClean="0"/>
-                        <a:t>Writing Clean Code</a:t>
+                        <a:t>Clean Code</a:t>
                       </a:r>
                       <a:endParaRPr lang="en-US" dirty="0"/>
                     </a:p>
@@ -14352,7 +14326,7 @@
                     <a:p>
                       <a:r>
                         <a:rPr lang="en-US" dirty="0" smtClean="0"/>
-                        <a:t>Refactoring practice and assistance</a:t>
+                        <a:t>Refactoring Techniques</a:t>
                       </a:r>
                       <a:endParaRPr lang="en-US" dirty="0"/>
                     </a:p>
@@ -14442,7 +14416,7 @@
                     <a:p>
                       <a:r>
                         <a:rPr lang="en-US" dirty="0" smtClean="0"/>
-                        <a:t>Conclusions</a:t>
+                        <a:t>Wrap-up</a:t>
                       </a:r>
                       <a:endParaRPr lang="en-US" dirty="0"/>
                     </a:p>
@@ -14886,7 +14860,6 @@
               <a:rPr lang="en-US" sz="2000" i="1" dirty="0" smtClean="0"/>
               <a:t>Uncle Bob Martin, Clean Code</a:t>
             </a:r>
-            <a:endParaRPr lang="en-US" sz="2000" i="1" dirty="0" smtClean="0"/>
           </a:p>
           <a:p>
             <a:endParaRPr lang="en-US" sz="2000" b="1" dirty="0" smtClean="0"/>

</xml_diff>

<commit_message>
minor updates to welcome presentation
</commit_message>
<xml_diff>
--- a/Refactoring Workshop.pptx
+++ b/Refactoring Workshop.pptx
@@ -10,9 +10,9 @@
   </p:notesMasterIdLst>
   <p:sldIdLst>
     <p:sldId id="256" r:id="rId3"/>
-    <p:sldId id="257" r:id="rId4"/>
-    <p:sldId id="266" r:id="rId5"/>
-    <p:sldId id="258" r:id="rId6"/>
+    <p:sldId id="266" r:id="rId4"/>
+    <p:sldId id="258" r:id="rId5"/>
+    <p:sldId id="257" r:id="rId6"/>
     <p:sldId id="270" r:id="rId7"/>
     <p:sldId id="259" r:id="rId8"/>
     <p:sldId id="261" r:id="rId9"/>
@@ -211,7 +211,7 @@
           <a:p>
             <a:fld id="{593211BE-2AAC-4A14-A5B4-00BA75A95635}" type="datetimeFigureOut">
               <a:rPr lang="en-US" smtClean="0"/>
-              <a:t>5/12/2014</a:t>
+              <a:t>5/14/2014</a:t>
             </a:fld>
             <a:endParaRPr lang="en-US"/>
           </a:p>
@@ -9061,6 +9061,88 @@
           <a:chExt cx="0" cy="0"/>
         </a:xfrm>
       </p:grpSpPr>
+      <p:pic>
+        <p:nvPicPr>
+          <p:cNvPr id="1028" name="Picture 4" descr="http://2.bp.blogspot.com/-Ha8ELy8Xpsw/UAjCzJ6WAqI/AAAAAAAAE-Y/GHa7ady2qhU/s1600/glass-of-dirty-water.jpg"/>
+          <p:cNvPicPr>
+            <a:picLocks noChangeAspect="1" noChangeArrowheads="1"/>
+          </p:cNvPicPr>
+          <p:nvPr/>
+        </p:nvPicPr>
+        <p:blipFill>
+          <a:blip r:embed="rId2" cstate="print">
+            <a:extLst>
+              <a:ext uri="{28A0092B-C50C-407E-A947-70E740481C1C}">
+                <a14:useLocalDpi xmlns:a14="http://schemas.microsoft.com/office/drawing/2010/main" val="0"/>
+              </a:ext>
+            </a:extLst>
+          </a:blip>
+          <a:srcRect/>
+          <a:stretch>
+            <a:fillRect/>
+          </a:stretch>
+        </p:blipFill>
+        <p:spPr bwMode="auto">
+          <a:xfrm>
+            <a:off x="1295400" y="1371600"/>
+            <a:ext cx="3418334" cy="4482500"/>
+          </a:xfrm>
+          <a:prstGeom prst="rect">
+            <a:avLst/>
+          </a:prstGeom>
+          <a:noFill/>
+          <a:extLst>
+            <a:ext uri="{909E8E84-426E-40DD-AFC4-6F175D3DCCD1}">
+              <a14:hiddenFill xmlns:a14="http://schemas.microsoft.com/office/drawing/2010/main">
+                <a:solidFill>
+                  <a:srgbClr val="FFFFFF"/>
+                </a:solidFill>
+              </a14:hiddenFill>
+            </a:ext>
+          </a:extLst>
+        </p:spPr>
+      </p:pic>
+      <p:pic>
+        <p:nvPicPr>
+          <p:cNvPr id="1026" name="Picture 2" descr="http://berrycreaxions.webstarts.com/uploads/red_wine_glass.jpg"/>
+          <p:cNvPicPr>
+            <a:picLocks noChangeAspect="1" noChangeArrowheads="1"/>
+          </p:cNvPicPr>
+          <p:nvPr/>
+        </p:nvPicPr>
+        <p:blipFill>
+          <a:blip r:embed="rId3">
+            <a:extLst>
+              <a:ext uri="{28A0092B-C50C-407E-A947-70E740481C1C}">
+                <a14:useLocalDpi xmlns:a14="http://schemas.microsoft.com/office/drawing/2010/main" val="0"/>
+              </a:ext>
+            </a:extLst>
+          </a:blip>
+          <a:srcRect/>
+          <a:stretch>
+            <a:fillRect/>
+          </a:stretch>
+        </p:blipFill>
+        <p:spPr bwMode="auto">
+          <a:xfrm>
+            <a:off x="4695825" y="1412304"/>
+            <a:ext cx="2695575" cy="4038601"/>
+          </a:xfrm>
+          <a:prstGeom prst="rect">
+            <a:avLst/>
+          </a:prstGeom>
+          <a:noFill/>
+          <a:extLst>
+            <a:ext uri="{909E8E84-426E-40DD-AFC4-6F175D3DCCD1}">
+              <a14:hiddenFill xmlns:a14="http://schemas.microsoft.com/office/drawing/2010/main">
+                <a:solidFill>
+                  <a:srgbClr val="FFFFFF"/>
+                </a:solidFill>
+              </a14:hiddenFill>
+            </a:ext>
+          </a:extLst>
+        </p:spPr>
+      </p:pic>
       <p:sp>
         <p:nvSpPr>
           <p:cNvPr id="2" name="Content Placeholder 1"/>
@@ -9073,7 +9155,7 @@
         </p:nvSpPr>
         <p:spPr>
           <a:xfrm>
-            <a:off x="304800" y="1371600"/>
+            <a:off x="246993" y="990600"/>
             <a:ext cx="8534400" cy="609600"/>
           </a:xfrm>
         </p:spPr>
@@ -9122,66 +9204,6 @@
           </a:p>
         </p:txBody>
       </p:sp>
-      <p:pic>
-        <p:nvPicPr>
-          <p:cNvPr id="5" name="Picture 4"/>
-          <p:cNvPicPr>
-            <a:picLocks noChangeAspect="1"/>
-          </p:cNvPicPr>
-          <p:nvPr/>
-        </p:nvPicPr>
-        <p:blipFill>
-          <a:blip r:embed="rId2">
-            <a:extLst>
-              <a:ext uri="{28A0092B-C50C-407E-A947-70E740481C1C}">
-                <a14:useLocalDpi xmlns:a14="http://schemas.microsoft.com/office/drawing/2010/main" val="0"/>
-              </a:ext>
-            </a:extLst>
-          </a:blip>
-          <a:stretch>
-            <a:fillRect/>
-          </a:stretch>
-        </p:blipFill>
-        <p:spPr>
-          <a:xfrm>
-            <a:off x="1905000" y="2488981"/>
-            <a:ext cx="2286000" cy="1790700"/>
-          </a:xfrm>
-          <a:prstGeom prst="rect">
-            <a:avLst/>
-          </a:prstGeom>
-        </p:spPr>
-      </p:pic>
-      <p:pic>
-        <p:nvPicPr>
-          <p:cNvPr id="6" name="Picture 5"/>
-          <p:cNvPicPr>
-            <a:picLocks noChangeAspect="1"/>
-          </p:cNvPicPr>
-          <p:nvPr/>
-        </p:nvPicPr>
-        <p:blipFill>
-          <a:blip r:embed="rId3">
-            <a:extLst>
-              <a:ext uri="{28A0092B-C50C-407E-A947-70E740481C1C}">
-                <a14:useLocalDpi xmlns:a14="http://schemas.microsoft.com/office/drawing/2010/main" val="0"/>
-              </a:ext>
-            </a:extLst>
-          </a:blip>
-          <a:stretch>
-            <a:fillRect/>
-          </a:stretch>
-        </p:blipFill>
-        <p:spPr>
-          <a:xfrm>
-            <a:off x="5029200" y="2365484"/>
-            <a:ext cx="2181225" cy="2095500"/>
-          </a:xfrm>
-          <a:prstGeom prst="rect">
-            <a:avLst/>
-          </a:prstGeom>
-        </p:spPr>
-      </p:pic>
       <p:sp>
         <p:nvSpPr>
           <p:cNvPr id="7" name="Content Placeholder 1"/>
@@ -9192,8 +9214,8 @@
         </p:nvSpPr>
         <p:spPr>
           <a:xfrm>
-            <a:off x="417786" y="4724400"/>
-            <a:ext cx="8192814" cy="1066800"/>
+            <a:off x="417786" y="5181600"/>
+            <a:ext cx="8192814" cy="701610"/>
           </a:xfrm>
           <a:prstGeom prst="rect">
             <a:avLst/>
@@ -10137,8 +10159,8 @@
         </p:blipFill>
         <p:spPr bwMode="auto">
           <a:xfrm>
-            <a:off x="0" y="557108"/>
-            <a:ext cx="6781800" cy="5736558"/>
+            <a:off x="0" y="528204"/>
+            <a:ext cx="9144000" cy="7734685"/>
           </a:xfrm>
           <a:prstGeom prst="rect">
             <a:avLst/>
@@ -10180,6 +10202,58 @@
               <a:t>A real life case study</a:t>
             </a:r>
             <a:endParaRPr lang="en-US" dirty="0"/>
+          </a:p>
+        </p:txBody>
+      </p:sp>
+      <p:sp>
+        <p:nvSpPr>
+          <p:cNvPr id="2" name="Rectangle 1"/>
+          <p:cNvSpPr/>
+          <p:nvPr/>
+        </p:nvSpPr>
+        <p:spPr>
+          <a:xfrm>
+            <a:off x="4572000" y="3733800"/>
+            <a:ext cx="3962400" cy="4114800"/>
+          </a:xfrm>
+          <a:prstGeom prst="rect">
+            <a:avLst/>
+          </a:prstGeom>
+          <a:solidFill>
+            <a:schemeClr val="bg1"/>
+          </a:solidFill>
+          <a:ln>
+            <a:solidFill>
+              <a:schemeClr val="bg1"/>
+            </a:solidFill>
+          </a:ln>
+        </p:spPr>
+        <p:style>
+          <a:lnRef idx="2">
+            <a:schemeClr val="accent1">
+              <a:shade val="50000"/>
+            </a:schemeClr>
+          </a:lnRef>
+          <a:fillRef idx="1">
+            <a:schemeClr val="accent1"/>
+          </a:fillRef>
+          <a:effectRef idx="0">
+            <a:schemeClr val="accent1"/>
+          </a:effectRef>
+          <a:fontRef idx="minor">
+            <a:schemeClr val="lt1"/>
+          </a:fontRef>
+        </p:style>
+        <p:txBody>
+          <a:bodyPr rtlCol="0" anchor="ctr"/>
+          <a:lstStyle/>
+          <a:p>
+            <a:pPr algn="ctr"/>
+            <a:endParaRPr lang="en-US">
+              <a:solidFill>
+                <a:schemeClr val="bg1"/>
+              </a:solidFill>
+            </a:endParaRPr>
           </a:p>
         </p:txBody>
       </p:sp>
@@ -11446,6 +11520,29 @@
           <a:chExt cx="0" cy="0"/>
         </a:xfrm>
       </p:grpSpPr>
+      <p:sp>
+        <p:nvSpPr>
+          <p:cNvPr id="3" name="Title 2"/>
+          <p:cNvSpPr>
+            <a:spLocks noGrp="1"/>
+          </p:cNvSpPr>
+          <p:nvPr>
+            <p:ph type="title"/>
+          </p:nvPr>
+        </p:nvSpPr>
+        <p:spPr/>
+        <p:txBody>
+          <a:bodyPr/>
+          <a:lstStyle/>
+          <a:p>
+            <a:r>
+              <a:rPr lang="en-US" dirty="0" smtClean="0"/>
+              <a:t>The Light at the End of the Tunnel</a:t>
+            </a:r>
+            <a:endParaRPr lang="en-US" dirty="0"/>
+          </a:p>
+        </p:txBody>
+      </p:sp>
       <p:pic>
         <p:nvPicPr>
           <p:cNvPr id="5" name="Content Placeholder 4"/>
@@ -11470,34 +11567,11 @@
         </p:blipFill>
         <p:spPr>
           <a:xfrm>
-            <a:off x="2812288" y="762001"/>
-            <a:ext cx="6242303" cy="4876800"/>
+            <a:off x="-18393" y="-28904"/>
+            <a:ext cx="9162393" cy="7158121"/>
           </a:xfrm>
         </p:spPr>
       </p:pic>
-      <p:sp>
-        <p:nvSpPr>
-          <p:cNvPr id="3" name="Title 2"/>
-          <p:cNvSpPr>
-            <a:spLocks noGrp="1"/>
-          </p:cNvSpPr>
-          <p:nvPr>
-            <p:ph type="title"/>
-          </p:nvPr>
-        </p:nvSpPr>
-        <p:spPr/>
-        <p:txBody>
-          <a:bodyPr/>
-          <a:lstStyle/>
-          <a:p>
-            <a:r>
-              <a:rPr lang="en-US" dirty="0" smtClean="0"/>
-              <a:t>The Light at the End of the Tunnel</a:t>
-            </a:r>
-            <a:endParaRPr lang="en-US" dirty="0"/>
-          </a:p>
-        </p:txBody>
-      </p:sp>
       <p:sp>
         <p:nvSpPr>
           <p:cNvPr id="7" name="Content Placeholder 1"/>
@@ -11508,8 +11582,8 @@
         </p:nvSpPr>
         <p:spPr>
           <a:xfrm>
-            <a:off x="152400" y="685800"/>
-            <a:ext cx="2590800" cy="5211764"/>
+            <a:off x="2362200" y="2209800"/>
+            <a:ext cx="6400800" cy="3382964"/>
           </a:xfrm>
           <a:prstGeom prst="rect">
             <a:avLst/>
@@ -11661,22 +11735,38 @@
           </a:lstStyle>
           <a:p>
             <a:r>
-              <a:rPr lang="en-US" dirty="0" smtClean="0"/>
+              <a:rPr lang="en-US" dirty="0" smtClean="0">
+                <a:solidFill>
+                  <a:schemeClr val="bg1"/>
+                </a:solidFill>
+              </a:rPr>
               <a:t>Code that is easy to maintain.</a:t>
             </a:r>
           </a:p>
           <a:p>
             <a:r>
-              <a:rPr lang="en-US" dirty="0" smtClean="0"/>
+              <a:rPr lang="en-US" dirty="0" smtClean="0">
+                <a:solidFill>
+                  <a:schemeClr val="bg1"/>
+                </a:solidFill>
+              </a:rPr>
               <a:t>Code that is flexible to change.</a:t>
             </a:r>
           </a:p>
           <a:p>
             <a:r>
-              <a:rPr lang="en-US" dirty="0" smtClean="0"/>
+              <a:rPr lang="en-US" dirty="0" smtClean="0">
+                <a:solidFill>
+                  <a:schemeClr val="bg1"/>
+                </a:solidFill>
+              </a:rPr>
               <a:t>Code that you want to re-use.</a:t>
             </a:r>
-            <a:endParaRPr lang="en-US" dirty="0"/>
+            <a:endParaRPr lang="en-US" dirty="0">
+              <a:solidFill>
+                <a:schemeClr val="bg1"/>
+              </a:solidFill>
+            </a:endParaRPr>
           </a:p>
         </p:txBody>
       </p:sp>
@@ -13164,8 +13254,8 @@
         </p:blipFill>
         <p:spPr>
           <a:xfrm>
-            <a:off x="228600" y="533400"/>
-            <a:ext cx="8743026" cy="5791200"/>
+            <a:off x="-5256" y="0"/>
+            <a:ext cx="10353583" cy="6858000"/>
           </a:xfrm>
         </p:spPr>
       </p:pic>
@@ -13259,56 +13349,6 @@
       </p:grpSpPr>
       <p:sp>
         <p:nvSpPr>
-          <p:cNvPr id="2" name="Content Placeholder 1"/>
-          <p:cNvSpPr>
-            <a:spLocks noGrp="1"/>
-          </p:cNvSpPr>
-          <p:nvPr>
-            <p:ph idx="1"/>
-          </p:nvPr>
-        </p:nvSpPr>
-        <p:spPr/>
-        <p:txBody>
-          <a:bodyPr/>
-          <a:lstStyle/>
-          <a:p>
-            <a:r>
-              <a:rPr lang="en-US" dirty="0" smtClean="0"/>
-              <a:t>Let’s get to refactoring…</a:t>
-            </a:r>
-          </a:p>
-          <a:p>
-            <a:endParaRPr lang="en-US" dirty="0" smtClean="0"/>
-          </a:p>
-          <a:p>
-            <a:endParaRPr lang="en-US" dirty="0"/>
-          </a:p>
-          <a:p>
-            <a:endParaRPr lang="en-US" dirty="0" smtClean="0"/>
-          </a:p>
-          <a:p>
-            <a:endParaRPr lang="en-US" dirty="0"/>
-          </a:p>
-          <a:p>
-            <a:endParaRPr lang="en-US" dirty="0" smtClean="0"/>
-          </a:p>
-          <a:p>
-            <a:endParaRPr lang="en-US" dirty="0"/>
-          </a:p>
-          <a:p>
-            <a:endParaRPr lang="en-US" dirty="0" smtClean="0"/>
-          </a:p>
-          <a:p>
-            <a:r>
-              <a:rPr lang="en-US" dirty="0" smtClean="0"/>
-              <a:t>Questions?</a:t>
-            </a:r>
-            <a:endParaRPr lang="en-US" dirty="0"/>
-          </a:p>
-        </p:txBody>
-      </p:sp>
-      <p:sp>
-        <p:nvSpPr>
           <p:cNvPr id="3" name="Title 2"/>
           <p:cNvSpPr>
             <a:spLocks noGrp="1"/>
@@ -13352,14 +13392,85 @@
         </p:blipFill>
         <p:spPr>
           <a:xfrm>
-            <a:off x="590550" y="1676399"/>
-            <a:ext cx="4972050" cy="3544667"/>
+            <a:off x="-152400" y="0"/>
+            <a:ext cx="9619610" cy="6858000"/>
           </a:xfrm>
           <a:prstGeom prst="rect">
             <a:avLst/>
           </a:prstGeom>
         </p:spPr>
       </p:pic>
+      <p:sp>
+        <p:nvSpPr>
+          <p:cNvPr id="2" name="Content Placeholder 1"/>
+          <p:cNvSpPr>
+            <a:spLocks noGrp="1"/>
+          </p:cNvSpPr>
+          <p:nvPr>
+            <p:ph idx="1"/>
+          </p:nvPr>
+        </p:nvSpPr>
+        <p:spPr>
+          <a:xfrm>
+            <a:off x="3057205" y="5715000"/>
+            <a:ext cx="3200400" cy="609600"/>
+          </a:xfrm>
+        </p:spPr>
+        <p:txBody>
+          <a:bodyPr/>
+          <a:lstStyle/>
+          <a:p>
+            <a:pPr marL="0" indent="0">
+              <a:buNone/>
+            </a:pPr>
+            <a:r>
+              <a:rPr lang="en-US" dirty="0" smtClean="0">
+                <a:solidFill>
+                  <a:schemeClr val="bg1"/>
+                </a:solidFill>
+              </a:rPr>
+              <a:t>Let’s get to </a:t>
+            </a:r>
+            <a:r>
+              <a:rPr lang="en-US" dirty="0" smtClean="0">
+                <a:solidFill>
+                  <a:schemeClr val="bg1"/>
+                </a:solidFill>
+              </a:rPr>
+              <a:t>it…</a:t>
+            </a:r>
+            <a:endParaRPr lang="en-US" dirty="0" smtClean="0">
+              <a:solidFill>
+                <a:schemeClr val="bg1"/>
+              </a:solidFill>
+            </a:endParaRPr>
+          </a:p>
+          <a:p>
+            <a:endParaRPr lang="en-US" dirty="0" smtClean="0"/>
+          </a:p>
+          <a:p>
+            <a:endParaRPr lang="en-US" dirty="0"/>
+          </a:p>
+          <a:p>
+            <a:endParaRPr lang="en-US" dirty="0" smtClean="0"/>
+          </a:p>
+          <a:p>
+            <a:endParaRPr lang="en-US" dirty="0"/>
+          </a:p>
+          <a:p>
+            <a:endParaRPr lang="en-US" dirty="0" smtClean="0"/>
+          </a:p>
+          <a:p>
+            <a:endParaRPr lang="en-US" dirty="0"/>
+          </a:p>
+          <a:p>
+            <a:pPr marL="0" indent="0">
+              <a:buNone/>
+            </a:pPr>
+            <a:endParaRPr lang="en-US" dirty="0" smtClean="0"/>
+          </a:p>
+        </p:txBody>
+      </p:sp>
     </p:spTree>
     <p:extLst>
       <p:ext uri="{BB962C8B-B14F-4D97-AF65-F5344CB8AC3E}">
@@ -13381,141 +13492,6 @@
 </file>
 
 <file path=ppt/slides/slide2.xml><?xml version="1.0" encoding="utf-8"?>
-<p:sld xmlns:a="http://schemas.openxmlformats.org/drawingml/2006/main" xmlns:r="http://schemas.openxmlformats.org/officeDocument/2006/relationships" xmlns:p="http://schemas.openxmlformats.org/presentationml/2006/main">
-  <p:cSld>
-    <p:spTree>
-      <p:nvGrpSpPr>
-        <p:cNvPr id="1" name=""/>
-        <p:cNvGrpSpPr/>
-        <p:nvPr/>
-      </p:nvGrpSpPr>
-      <p:grpSpPr>
-        <a:xfrm>
-          <a:off x="0" y="0"/>
-          <a:ext cx="0" cy="0"/>
-          <a:chOff x="0" y="0"/>
-          <a:chExt cx="0" cy="0"/>
-        </a:xfrm>
-      </p:grpSpPr>
-      <p:sp>
-        <p:nvSpPr>
-          <p:cNvPr id="2" name="Content Placeholder 1"/>
-          <p:cNvSpPr>
-            <a:spLocks noGrp="1"/>
-          </p:cNvSpPr>
-          <p:nvPr>
-            <p:ph idx="1"/>
-          </p:nvPr>
-        </p:nvSpPr>
-        <p:spPr/>
-        <p:txBody>
-          <a:bodyPr>
-            <a:normAutofit/>
-          </a:bodyPr>
-          <a:lstStyle/>
-          <a:p>
-            <a:pPr marL="0" indent="0">
-              <a:buNone/>
-            </a:pPr>
-            <a:r>
-              <a:rPr lang="en-US" dirty="0" smtClean="0"/>
-              <a:t>Lab facilitators</a:t>
-            </a:r>
-          </a:p>
-          <a:p>
-            <a:r>
-              <a:rPr lang="en-US" dirty="0" smtClean="0"/>
-              <a:t>Patrick Delancy – DEG</a:t>
-            </a:r>
-          </a:p>
-          <a:p>
-            <a:r>
-              <a:rPr lang="en-US" dirty="0" smtClean="0"/>
-              <a:t>Gabe Campbell - </a:t>
-            </a:r>
-            <a:r>
-              <a:rPr lang="en-US" dirty="0" err="1" smtClean="0"/>
-              <a:t>Epiq</a:t>
-            </a:r>
-            <a:endParaRPr lang="en-US" dirty="0" smtClean="0"/>
-          </a:p>
-        </p:txBody>
-      </p:sp>
-      <p:sp>
-        <p:nvSpPr>
-          <p:cNvPr id="3" name="Title 2"/>
-          <p:cNvSpPr>
-            <a:spLocks noGrp="1"/>
-          </p:cNvSpPr>
-          <p:nvPr>
-            <p:ph type="title"/>
-          </p:nvPr>
-        </p:nvSpPr>
-        <p:spPr/>
-        <p:txBody>
-          <a:bodyPr/>
-          <a:lstStyle/>
-          <a:p>
-            <a:r>
-              <a:rPr lang="en-US" dirty="0" smtClean="0"/>
-              <a:t>Turning Water into Wine</a:t>
-            </a:r>
-            <a:endParaRPr lang="en-US" dirty="0"/>
-          </a:p>
-        </p:txBody>
-      </p:sp>
-      <p:sp>
-        <p:nvSpPr>
-          <p:cNvPr id="4" name="Footer Placeholder 3"/>
-          <p:cNvSpPr>
-            <a:spLocks noGrp="1"/>
-          </p:cNvSpPr>
-          <p:nvPr>
-            <p:ph type="ftr" sz="quarter" idx="10"/>
-          </p:nvPr>
-        </p:nvSpPr>
-        <p:spPr/>
-        <p:txBody>
-          <a:bodyPr/>
-          <a:lstStyle/>
-          <a:p>
-            <a:r>
-              <a:rPr lang="en-US" dirty="0" smtClean="0"/>
-              <a:t>Change Presentation Title on Insert Ribbon :: Date Here</a:t>
-            </a:r>
-            <a:endParaRPr lang="en-US" dirty="0"/>
-          </a:p>
-        </p:txBody>
-      </p:sp>
-    </p:spTree>
-    <p:extLst>
-      <p:ext uri="{BB962C8B-B14F-4D97-AF65-F5344CB8AC3E}">
-        <p14:creationId xmlns:p14="http://schemas.microsoft.com/office/powerpoint/2010/main" val="3664266628"/>
-      </p:ext>
-    </p:extLst>
-  </p:cSld>
-  <p:clrMapOvr>
-    <a:masterClrMapping/>
-  </p:clrMapOvr>
-  <mc:AlternateContent xmlns:mc="http://schemas.openxmlformats.org/markup-compatibility/2006" xmlns:p14="http://schemas.microsoft.com/office/powerpoint/2010/main">
-    <mc:Choice Requires="p14">
-      <p:transition spd="slow" p14:dur="2000"/>
-    </mc:Choice>
-    <mc:Fallback xmlns="">
-      <p:transition spd="slow"/>
-    </mc:Fallback>
-  </mc:AlternateContent>
-  <p:timing>
-    <p:tnLst>
-      <p:par>
-        <p:cTn id="1" dur="indefinite" restart="never" nodeType="tmRoot"/>
-      </p:par>
-    </p:tnLst>
-  </p:timing>
-</p:sld>
-</file>
-
-<file path=ppt/slides/slide3.xml><?xml version="1.0" encoding="utf-8"?>
 <p:sld xmlns:a="http://schemas.openxmlformats.org/drawingml/2006/main" xmlns:r="http://schemas.openxmlformats.org/officeDocument/2006/relationships" xmlns:p="http://schemas.openxmlformats.org/presentationml/2006/main">
   <p:cSld>
     <p:spTree>
@@ -13958,7 +13934,7 @@
 </p:sld>
 </file>
 
-<file path=ppt/slides/slide4.xml><?xml version="1.0" encoding="utf-8"?>
+<file path=ppt/slides/slide3.xml><?xml version="1.0" encoding="utf-8"?>
 <p:sld xmlns:a="http://schemas.openxmlformats.org/drawingml/2006/main" xmlns:r="http://schemas.openxmlformats.org/officeDocument/2006/relationships" xmlns:p="http://schemas.openxmlformats.org/presentationml/2006/main">
   <p:cSld>
     <p:spTree>
@@ -14031,7 +14007,7 @@
           <p:nvPr>
             <p:extLst>
               <p:ext uri="{D42A27DB-BD31-4B8C-83A1-F6EECF244321}">
-                <p14:modId xmlns:p14="http://schemas.microsoft.com/office/powerpoint/2010/main" val="543504191"/>
+                <p14:modId xmlns:p14="http://schemas.microsoft.com/office/powerpoint/2010/main" val="1993708431"/>
               </p:ext>
             </p:extLst>
           </p:nvPr>
@@ -14102,7 +14078,11 @@
                     <a:p>
                       <a:r>
                         <a:rPr lang="en-US" dirty="0" smtClean="0"/>
-                        <a:t>Intro &amp; Calories Calculator App</a:t>
+                        <a:t>Intro &amp; </a:t>
+                      </a:r>
+                      <a:r>
+                        <a:rPr lang="en-US" dirty="0" smtClean="0"/>
+                        <a:t>Walkthrough</a:t>
                       </a:r>
                       <a:endParaRPr lang="en-US" dirty="0"/>
                     </a:p>
@@ -14372,6 +14352,295 @@
     <p:tnLst>
       <p:par>
         <p:cTn id="1" dur="indefinite" restart="never" nodeType="tmRoot"/>
+      </p:par>
+    </p:tnLst>
+  </p:timing>
+</p:sld>
+</file>
+
+<file path=ppt/slides/slide4.xml><?xml version="1.0" encoding="utf-8"?>
+<p:sld xmlns:a="http://schemas.openxmlformats.org/drawingml/2006/main" xmlns:r="http://schemas.openxmlformats.org/officeDocument/2006/relationships" xmlns:p="http://schemas.openxmlformats.org/presentationml/2006/main">
+  <p:cSld>
+    <p:spTree>
+      <p:nvGrpSpPr>
+        <p:cNvPr id="1" name=""/>
+        <p:cNvGrpSpPr/>
+        <p:nvPr/>
+      </p:nvGrpSpPr>
+      <p:grpSpPr>
+        <a:xfrm>
+          <a:off x="0" y="0"/>
+          <a:ext cx="0" cy="0"/>
+          <a:chOff x="0" y="0"/>
+          <a:chExt cx="0" cy="0"/>
+        </a:xfrm>
+      </p:grpSpPr>
+      <p:sp>
+        <p:nvSpPr>
+          <p:cNvPr id="2" name="Content Placeholder 1"/>
+          <p:cNvSpPr>
+            <a:spLocks noGrp="1"/>
+          </p:cNvSpPr>
+          <p:nvPr>
+            <p:ph idx="1"/>
+          </p:nvPr>
+        </p:nvSpPr>
+        <p:spPr>
+          <a:xfrm>
+            <a:off x="228600" y="1752600"/>
+            <a:ext cx="8686800" cy="2971800"/>
+          </a:xfrm>
+        </p:spPr>
+        <p:txBody>
+          <a:bodyPr>
+            <a:normAutofit/>
+          </a:bodyPr>
+          <a:lstStyle/>
+          <a:p>
+            <a:pPr marL="0" indent="0">
+              <a:buNone/>
+            </a:pPr>
+            <a:r>
+              <a:rPr lang="en-US" sz="4800" dirty="0" smtClean="0"/>
+              <a:t>Lab facilitators</a:t>
+            </a:r>
+          </a:p>
+          <a:p>
+            <a:r>
+              <a:rPr lang="en-US" sz="4800" dirty="0" smtClean="0"/>
+              <a:t>Patrick Delancy – DEG</a:t>
+            </a:r>
+          </a:p>
+          <a:p>
+            <a:r>
+              <a:rPr lang="en-US" sz="4800" dirty="0" smtClean="0"/>
+              <a:t>Gabe </a:t>
+            </a:r>
+            <a:r>
+              <a:rPr lang="en-US" sz="4800" dirty="0" smtClean="0"/>
+              <a:t>Campbell - </a:t>
+            </a:r>
+            <a:r>
+              <a:rPr lang="en-US" sz="4800" dirty="0" err="1" smtClean="0"/>
+              <a:t>Epiq</a:t>
+            </a:r>
+            <a:endParaRPr lang="en-US" sz="4800" dirty="0" smtClean="0"/>
+          </a:p>
+        </p:txBody>
+      </p:sp>
+      <p:sp>
+        <p:nvSpPr>
+          <p:cNvPr id="3" name="Title 2"/>
+          <p:cNvSpPr>
+            <a:spLocks noGrp="1"/>
+          </p:cNvSpPr>
+          <p:nvPr>
+            <p:ph type="title"/>
+          </p:nvPr>
+        </p:nvSpPr>
+        <p:spPr/>
+        <p:txBody>
+          <a:bodyPr/>
+          <a:lstStyle/>
+          <a:p>
+            <a:r>
+              <a:rPr lang="en-US" dirty="0" smtClean="0"/>
+              <a:t>Turning Water into Wine</a:t>
+            </a:r>
+            <a:endParaRPr lang="en-US" dirty="0"/>
+          </a:p>
+        </p:txBody>
+      </p:sp>
+      <p:sp>
+        <p:nvSpPr>
+          <p:cNvPr id="4" name="Footer Placeholder 3"/>
+          <p:cNvSpPr>
+            <a:spLocks noGrp="1"/>
+          </p:cNvSpPr>
+          <p:nvPr>
+            <p:ph type="ftr" sz="quarter" idx="10"/>
+          </p:nvPr>
+        </p:nvSpPr>
+        <p:spPr/>
+        <p:txBody>
+          <a:bodyPr/>
+          <a:lstStyle/>
+          <a:p>
+            <a:r>
+              <a:rPr lang="en-US" dirty="0" smtClean="0"/>
+              <a:t>Change Presentation Title on Insert Ribbon :: Date Here</a:t>
+            </a:r>
+            <a:endParaRPr lang="en-US" dirty="0"/>
+          </a:p>
+        </p:txBody>
+      </p:sp>
+    </p:spTree>
+    <p:extLst>
+      <p:ext uri="{BB962C8B-B14F-4D97-AF65-F5344CB8AC3E}">
+        <p14:creationId xmlns:p14="http://schemas.microsoft.com/office/powerpoint/2010/main" val="3664266628"/>
+      </p:ext>
+    </p:extLst>
+  </p:cSld>
+  <p:clrMapOvr>
+    <a:masterClrMapping/>
+  </p:clrMapOvr>
+  <mc:AlternateContent xmlns:mc="http://schemas.openxmlformats.org/markup-compatibility/2006" xmlns:p14="http://schemas.microsoft.com/office/powerpoint/2010/main">
+    <mc:Choice Requires="p14">
+      <p:transition spd="slow" p14:dur="2000"/>
+    </mc:Choice>
+    <mc:Fallback xmlns="">
+      <p:transition spd="slow"/>
+    </mc:Fallback>
+  </mc:AlternateContent>
+  <p:timing>
+    <p:tnLst>
+      <p:par>
+        <p:cTn id="1" dur="indefinite" restart="never" nodeType="tmRoot">
+          <p:childTnLst>
+            <p:seq concurrent="1" nextAc="seek">
+              <p:cTn id="2" dur="indefinite" nodeType="mainSeq">
+                <p:childTnLst>
+                  <p:par>
+                    <p:cTn id="3" fill="hold">
+                      <p:stCondLst>
+                        <p:cond delay="indefinite"/>
+                      </p:stCondLst>
+                      <p:childTnLst>
+                        <p:par>
+                          <p:cTn id="4" fill="hold">
+                            <p:stCondLst>
+                              <p:cond delay="0"/>
+                            </p:stCondLst>
+                            <p:childTnLst>
+                              <p:par>
+                                <p:cTn id="5" presetID="10" presetClass="entr" presetSubtype="0" fill="hold" nodeType="clickEffect">
+                                  <p:stCondLst>
+                                    <p:cond delay="0"/>
+                                  </p:stCondLst>
+                                  <p:childTnLst>
+                                    <p:set>
+                                      <p:cBhvr>
+                                        <p:cTn id="6" dur="1" fill="hold">
+                                          <p:stCondLst>
+                                            <p:cond delay="0"/>
+                                          </p:stCondLst>
+                                        </p:cTn>
+                                        <p:tgtEl>
+                                          <p:spTgt spid="2">
+                                            <p:txEl>
+                                              <p:pRg st="1" end="1"/>
+                                            </p:txEl>
+                                          </p:spTgt>
+                                        </p:tgtEl>
+                                        <p:attrNameLst>
+                                          <p:attrName>style.visibility</p:attrName>
+                                        </p:attrNameLst>
+                                      </p:cBhvr>
+                                      <p:to>
+                                        <p:strVal val="visible"/>
+                                      </p:to>
+                                    </p:set>
+                                    <p:animEffect transition="in" filter="fade">
+                                      <p:cBhvr>
+                                        <p:cTn id="7" dur="500"/>
+                                        <p:tgtEl>
+                                          <p:spTgt spid="2">
+                                            <p:txEl>
+                                              <p:pRg st="1" end="1"/>
+                                            </p:txEl>
+                                          </p:spTgt>
+                                        </p:tgtEl>
+                                      </p:cBhvr>
+                                    </p:animEffect>
+                                  </p:childTnLst>
+                                </p:cTn>
+                              </p:par>
+                            </p:childTnLst>
+                          </p:cTn>
+                        </p:par>
+                      </p:childTnLst>
+                    </p:cTn>
+                  </p:par>
+                  <p:par>
+                    <p:cTn id="8" fill="hold">
+                      <p:stCondLst>
+                        <p:cond delay="indefinite"/>
+                      </p:stCondLst>
+                      <p:childTnLst>
+                        <p:par>
+                          <p:cTn id="9" fill="hold">
+                            <p:stCondLst>
+                              <p:cond delay="0"/>
+                            </p:stCondLst>
+                            <p:childTnLst>
+                              <p:par>
+                                <p:cTn id="10" presetID="10" presetClass="entr" presetSubtype="0" fill="hold" nodeType="clickEffect">
+                                  <p:stCondLst>
+                                    <p:cond delay="0"/>
+                                  </p:stCondLst>
+                                  <p:childTnLst>
+                                    <p:set>
+                                      <p:cBhvr>
+                                        <p:cTn id="11" dur="1" fill="hold">
+                                          <p:stCondLst>
+                                            <p:cond delay="0"/>
+                                          </p:stCondLst>
+                                        </p:cTn>
+                                        <p:tgtEl>
+                                          <p:spTgt spid="2">
+                                            <p:txEl>
+                                              <p:pRg st="2" end="2"/>
+                                            </p:txEl>
+                                          </p:spTgt>
+                                        </p:tgtEl>
+                                        <p:attrNameLst>
+                                          <p:attrName>style.visibility</p:attrName>
+                                        </p:attrNameLst>
+                                      </p:cBhvr>
+                                      <p:to>
+                                        <p:strVal val="visible"/>
+                                      </p:to>
+                                    </p:set>
+                                    <p:animEffect transition="in" filter="fade">
+                                      <p:cBhvr>
+                                        <p:cTn id="12" dur="500"/>
+                                        <p:tgtEl>
+                                          <p:spTgt spid="2">
+                                            <p:txEl>
+                                              <p:pRg st="2" end="2"/>
+                                            </p:txEl>
+                                          </p:spTgt>
+                                        </p:tgtEl>
+                                      </p:cBhvr>
+                                    </p:animEffect>
+                                  </p:childTnLst>
+                                </p:cTn>
+                              </p:par>
+                            </p:childTnLst>
+                          </p:cTn>
+                        </p:par>
+                      </p:childTnLst>
+                    </p:cTn>
+                  </p:par>
+                </p:childTnLst>
+              </p:cTn>
+              <p:prevCondLst>
+                <p:cond evt="onPrev" delay="0">
+                  <p:tgtEl>
+                    <p:sldTgt/>
+                  </p:tgtEl>
+                </p:cond>
+              </p:prevCondLst>
+              <p:nextCondLst>
+                <p:cond evt="onNext" delay="0">
+                  <p:tgtEl>
+                    <p:sldTgt/>
+                  </p:tgtEl>
+                </p:cond>
+              </p:nextCondLst>
+            </p:seq>
+          </p:childTnLst>
+        </p:cTn>
       </p:par>
     </p:tnLst>
   </p:timing>
@@ -16463,11 +16732,7 @@
                     <a:p>
                       <a:r>
                         <a:rPr lang="en-US" dirty="0" smtClean="0"/>
-                        <a:t>Developer B </a:t>
-                      </a:r>
-                      <a:r>
-                        <a:rPr lang="en-US" dirty="0" smtClean="0"/>
-                        <a:t>(</a:t>
+                        <a:t>Developer B (</a:t>
                       </a:r>
                       <a:r>
                         <a:rPr lang="en-US" dirty="0" err="1" smtClean="0"/>

</xml_diff>